<commit_message>
pres with no duplicates in pop music
</commit_message>
<xml_diff>
--- a/presentation_4_20_22.pptx
+++ b/presentation_4_20_22.pptx
@@ -2341,9 +2341,14 @@
             </a:lnSpc>
           </a:pPr>
           <a:r>
-            <a:rPr lang="en-US"/>
-            <a:t>Binary classifier – to determine the most informative features</a:t>
+            <a:rPr lang="en-US" dirty="0"/>
+            <a:t>Binary classifier – </a:t>
           </a:r>
+          <a:r>
+            <a:rPr lang="en-US" i="1" dirty="0"/>
+            <a:t>not included here</a:t>
+          </a:r>
+          <a:endParaRPr lang="en-US" dirty="0"/>
         </a:p>
       </dgm:t>
     </dgm:pt>
@@ -2818,7 +2823,7 @@
       </dsp:nvSpPr>
       <dsp:spPr>
         <a:xfrm>
-          <a:off x="1963800" y="447510"/>
+          <a:off x="1963800" y="578018"/>
           <a:ext cx="1512000" cy="1512000"/>
         </a:xfrm>
         <a:prstGeom prst="rect">
@@ -2868,7 +2873,7 @@
       </dsp:nvSpPr>
       <dsp:spPr>
         <a:xfrm>
-          <a:off x="559800" y="2108131"/>
+          <a:off x="559800" y="2227416"/>
           <a:ext cx="4320000" cy="648000"/>
         </a:xfrm>
         <a:prstGeom prst="rect">
@@ -2918,7 +2923,7 @@
         </a:p>
       </dsp:txBody>
       <dsp:txXfrm>
-        <a:off x="559800" y="2108131"/>
+        <a:off x="559800" y="2227416"/>
         <a:ext cx="4320000" cy="648000"/>
       </dsp:txXfrm>
     </dsp:sp>
@@ -2929,8 +2934,8 @@
       </dsp:nvSpPr>
       <dsp:spPr>
         <a:xfrm>
-          <a:off x="559800" y="2825258"/>
-          <a:ext cx="4320000" cy="1078569"/>
+          <a:off x="559800" y="2939322"/>
+          <a:ext cx="4320000" cy="833997"/>
         </a:xfrm>
         <a:prstGeom prst="rect">
           <a:avLst/>
@@ -2998,8 +3003,8 @@
         </a:p>
       </dsp:txBody>
       <dsp:txXfrm>
-        <a:off x="559800" y="2825258"/>
-        <a:ext cx="4320000" cy="1078569"/>
+        <a:off x="559800" y="2939322"/>
+        <a:ext cx="4320000" cy="833997"/>
       </dsp:txXfrm>
     </dsp:sp>
     <dsp:sp modelId="{FB5B4E02-4EC4-492C-B95F-8C20DF8AFF8D}">
@@ -3009,7 +3014,7 @@
       </dsp:nvSpPr>
       <dsp:spPr>
         <a:xfrm>
-          <a:off x="7039800" y="447510"/>
+          <a:off x="7039800" y="578018"/>
           <a:ext cx="1512000" cy="1512000"/>
         </a:xfrm>
         <a:prstGeom prst="rect">
@@ -3059,7 +3064,7 @@
       </dsp:nvSpPr>
       <dsp:spPr>
         <a:xfrm>
-          <a:off x="5635800" y="2108131"/>
+          <a:off x="5635800" y="2227416"/>
           <a:ext cx="4320000" cy="648000"/>
         </a:xfrm>
         <a:prstGeom prst="rect">
@@ -3109,7 +3114,7 @@
         </a:p>
       </dsp:txBody>
       <dsp:txXfrm>
-        <a:off x="5635800" y="2108131"/>
+        <a:off x="5635800" y="2227416"/>
         <a:ext cx="4320000" cy="648000"/>
       </dsp:txXfrm>
     </dsp:sp>
@@ -3120,8 +3125,8 @@
       </dsp:nvSpPr>
       <dsp:spPr>
         <a:xfrm>
-          <a:off x="5635800" y="2825258"/>
-          <a:ext cx="4320000" cy="1078569"/>
+          <a:off x="5635800" y="2939322"/>
+          <a:ext cx="4320000" cy="833997"/>
         </a:xfrm>
         <a:prstGeom prst="rect">
           <a:avLst/>
@@ -3181,14 +3186,19 @@
             <a:buNone/>
           </a:pPr>
           <a:r>
-            <a:rPr lang="en-US" sz="1600" kern="1200"/>
-            <a:t>Binary classifier – to determine the most informative features</a:t>
+            <a:rPr lang="en-US" sz="1600" kern="1200" dirty="0"/>
+            <a:t>Binary classifier – </a:t>
           </a:r>
+          <a:r>
+            <a:rPr lang="en-US" sz="1600" i="1" kern="1200" dirty="0"/>
+            <a:t>not included here</a:t>
+          </a:r>
+          <a:endParaRPr lang="en-US" sz="1600" kern="1200" dirty="0"/>
         </a:p>
       </dsp:txBody>
       <dsp:txXfrm>
-        <a:off x="5635800" y="2825258"/>
-        <a:ext cx="4320000" cy="1078569"/>
+        <a:off x="5635800" y="2939322"/>
+        <a:ext cx="4320000" cy="833997"/>
       </dsp:txXfrm>
     </dsp:sp>
   </dsp:spTree>
@@ -6809,6 +6819,12 @@
             </a:r>
           </a:p>
           <a:p>
+            <a:r>
+              <a:rPr lang="en-US" dirty="0"/>
+              <a:t>	https://github.com/Data-Science-for-Linguists-2021/Rapper_Topic_Modeling</a:t>
+            </a:r>
+          </a:p>
+          <a:p>
             <a:endParaRPr lang="en-US" dirty="0"/>
           </a:p>
           <a:p>
@@ -20131,6 +20147,96 @@
           </a:p>
         </p:txBody>
       </p:sp>
+      <p:pic>
+        <p:nvPicPr>
+          <p:cNvPr id="8" name="Picture 7">
+            <a:extLst>
+              <a:ext uri="{FF2B5EF4-FFF2-40B4-BE49-F238E27FC236}">
+                <a16:creationId xmlns:a16="http://schemas.microsoft.com/office/drawing/2014/main" id="{A7BB4C33-31E0-49BC-A461-87A3D9AB4A53}"/>
+              </a:ext>
+            </a:extLst>
+          </p:cNvPr>
+          <p:cNvPicPr>
+            <a:picLocks noChangeAspect="1"/>
+          </p:cNvPicPr>
+          <p:nvPr/>
+        </p:nvPicPr>
+        <p:blipFill>
+          <a:blip r:embed="rId3"/>
+          <a:stretch>
+            <a:fillRect/>
+          </a:stretch>
+        </p:blipFill>
+        <p:spPr>
+          <a:xfrm>
+            <a:off x="6384575" y="2720036"/>
+            <a:ext cx="2894240" cy="1207627"/>
+          </a:xfrm>
+          <a:prstGeom prst="rect">
+            <a:avLst/>
+          </a:prstGeom>
+        </p:spPr>
+      </p:pic>
+      <p:pic>
+        <p:nvPicPr>
+          <p:cNvPr id="10" name="Picture 9">
+            <a:extLst>
+              <a:ext uri="{FF2B5EF4-FFF2-40B4-BE49-F238E27FC236}">
+                <a16:creationId xmlns:a16="http://schemas.microsoft.com/office/drawing/2014/main" id="{29A43D9F-4F1D-4BDC-A914-9CE6299F7481}"/>
+              </a:ext>
+            </a:extLst>
+          </p:cNvPr>
+          <p:cNvPicPr>
+            <a:picLocks noChangeAspect="1"/>
+          </p:cNvPicPr>
+          <p:nvPr/>
+        </p:nvPicPr>
+        <p:blipFill>
+          <a:blip r:embed="rId4"/>
+          <a:stretch>
+            <a:fillRect/>
+          </a:stretch>
+        </p:blipFill>
+        <p:spPr>
+          <a:xfrm>
+            <a:off x="6324737" y="1284449"/>
+            <a:ext cx="4407973" cy="1325563"/>
+          </a:xfrm>
+          <a:prstGeom prst="rect">
+            <a:avLst/>
+          </a:prstGeom>
+        </p:spPr>
+      </p:pic>
+      <p:pic>
+        <p:nvPicPr>
+          <p:cNvPr id="12" name="Picture 11">
+            <a:extLst>
+              <a:ext uri="{FF2B5EF4-FFF2-40B4-BE49-F238E27FC236}">
+                <a16:creationId xmlns:a16="http://schemas.microsoft.com/office/drawing/2014/main" id="{24BE6692-913A-476D-A742-2E7B3BD4EE91}"/>
+              </a:ext>
+            </a:extLst>
+          </p:cNvPr>
+          <p:cNvPicPr>
+            <a:picLocks noChangeAspect="1"/>
+          </p:cNvPicPr>
+          <p:nvPr/>
+        </p:nvPicPr>
+        <p:blipFill>
+          <a:blip r:embed="rId5"/>
+          <a:stretch>
+            <a:fillRect/>
+          </a:stretch>
+        </p:blipFill>
+        <p:spPr>
+          <a:xfrm>
+            <a:off x="9182467" y="2931589"/>
+            <a:ext cx="2564058" cy="653353"/>
+          </a:xfrm>
+          <a:prstGeom prst="rect">
+            <a:avLst/>
+          </a:prstGeom>
+        </p:spPr>
+      </p:pic>
     </p:spTree>
     <p:extLst>
       <p:ext uri="{BB962C8B-B14F-4D97-AF65-F5344CB8AC3E}">
@@ -20347,14 +20453,16 @@
           </a:xfrm>
         </p:spPr>
         <p:txBody>
-          <a:bodyPr anchor="ctr"/>
+          <a:bodyPr anchor="ctr">
+            <a:normAutofit/>
+          </a:bodyPr>
           <a:lstStyle/>
           <a:p>
             <a:pPr marL="0" indent="0" algn="ctr">
               <a:buNone/>
             </a:pPr>
             <a:r>
-              <a:rPr lang="en-US" dirty="0"/>
+              <a:rPr lang="en-US" sz="2400" dirty="0"/>
               <a:t>Foreign language data.</a:t>
             </a:r>
           </a:p>
@@ -23024,20 +23132,20 @@
           <a:p>
             <a:r>
               <a:rPr lang="en-US" dirty="0"/>
-              <a:t>4,847 lyric entries</a:t>
+              <a:t>4,627 lyric entries</a:t>
             </a:r>
           </a:p>
           <a:p>
             <a:r>
               <a:rPr lang="en-US" dirty="0"/>
-              <a:t>2,340 unique artists</a:t>
+              <a:t>2,335 unique artists</a:t>
             </a:r>
           </a:p>
           <a:p>
             <a:pPr lvl="1"/>
             <a:r>
               <a:rPr lang="en-US" dirty="0"/>
-              <a:t>34 songs by Madonna (&lt;1%)</a:t>
+              <a:t>33 songs by Madonna (&lt;1%)</a:t>
             </a:r>
           </a:p>
           <a:p>
@@ -23194,10 +23302,10 @@
       </p:sp>
       <p:pic>
         <p:nvPicPr>
-          <p:cNvPr id="9" name="Picture 8" descr="Chart, pie chart&#10;&#10;Description automatically generated">
+          <p:cNvPr id="8" name="Picture 7" descr="Chart, pie chart&#10;&#10;Description automatically generated">
             <a:extLst>
               <a:ext uri="{FF2B5EF4-FFF2-40B4-BE49-F238E27FC236}">
-                <a16:creationId xmlns:a16="http://schemas.microsoft.com/office/drawing/2014/main" id="{D2AD758F-CB35-4BB4-850B-16F09A113741}"/>
+                <a16:creationId xmlns:a16="http://schemas.microsoft.com/office/drawing/2014/main" id="{55160982-42BA-4817-A6FD-0076381B41F2}"/>
               </a:ext>
             </a:extLst>
           </p:cNvPr>
@@ -23214,8 +23322,8 @@
         </p:blipFill>
         <p:spPr>
           <a:xfrm>
-            <a:off x="6245846" y="668080"/>
-            <a:ext cx="5768676" cy="3845784"/>
+            <a:off x="6553200" y="717188"/>
+            <a:ext cx="5487650" cy="3658433"/>
           </a:xfrm>
           <a:prstGeom prst="rect">
             <a:avLst/>
@@ -23224,10 +23332,10 @@
       </p:pic>
       <p:pic>
         <p:nvPicPr>
-          <p:cNvPr id="11" name="Picture 10" descr="A picture containing chart&#10;&#10;Description automatically generated">
+          <p:cNvPr id="12" name="Picture 11" descr="A picture containing diagram&#10;&#10;Description automatically generated">
             <a:extLst>
               <a:ext uri="{FF2B5EF4-FFF2-40B4-BE49-F238E27FC236}">
-                <a16:creationId xmlns:a16="http://schemas.microsoft.com/office/drawing/2014/main" id="{03E7BD74-F31B-44D0-B73C-4035A0CB0DEB}"/>
+                <a16:creationId xmlns:a16="http://schemas.microsoft.com/office/drawing/2014/main" id="{47F0855B-4AAB-4B85-A6ED-67C96E5D381B}"/>
               </a:ext>
             </a:extLst>
           </p:cNvPr>
@@ -23238,19 +23346,90 @@
         </p:nvPicPr>
         <p:blipFill rotWithShape="1">
           <a:blip r:embed="rId4"/>
-          <a:srcRect b="14170"/>
+          <a:srcRect l="16632" r="11643" b="15022"/>
           <a:stretch/>
         </p:blipFill>
         <p:spPr>
           <a:xfrm>
-            <a:off x="6553200" y="4144058"/>
-            <a:ext cx="3772043" cy="2158357"/>
+            <a:off x="6917634" y="4039263"/>
+            <a:ext cx="2933597" cy="2317087"/>
           </a:xfrm>
           <a:prstGeom prst="rect">
             <a:avLst/>
           </a:prstGeom>
         </p:spPr>
       </p:pic>
+      <p:sp>
+        <p:nvSpPr>
+          <p:cNvPr id="13" name="TextBox 12">
+            <a:extLst>
+              <a:ext uri="{FF2B5EF4-FFF2-40B4-BE49-F238E27FC236}">
+                <a16:creationId xmlns:a16="http://schemas.microsoft.com/office/drawing/2014/main" id="{51E25D64-DE83-44F5-8DE9-9F036C56AE4F}"/>
+              </a:ext>
+            </a:extLst>
+          </p:cNvPr>
+          <p:cNvSpPr txBox="1"/>
+          <p:nvPr/>
+        </p:nvSpPr>
+        <p:spPr>
+          <a:xfrm>
+            <a:off x="8610600" y="1027906"/>
+            <a:ext cx="3650566" cy="261610"/>
+          </a:xfrm>
+          <a:prstGeom prst="rect">
+            <a:avLst/>
+          </a:prstGeom>
+          <a:noFill/>
+        </p:spPr>
+        <p:txBody>
+          <a:bodyPr wrap="square" rtlCol="0">
+            <a:spAutoFit/>
+          </a:bodyPr>
+          <a:lstStyle/>
+          <a:p>
+            <a:r>
+              <a:rPr lang="en-US" sz="1100" dirty="0"/>
+              <a:t>15 artists represent 6% of the data</a:t>
+            </a:r>
+          </a:p>
+        </p:txBody>
+      </p:sp>
+      <p:sp>
+        <p:nvSpPr>
+          <p:cNvPr id="14" name="TextBox 13">
+            <a:extLst>
+              <a:ext uri="{FF2B5EF4-FFF2-40B4-BE49-F238E27FC236}">
+                <a16:creationId xmlns:a16="http://schemas.microsoft.com/office/drawing/2014/main" id="{39A6AF6E-160C-453B-9C28-56AB89BDA67B}"/>
+              </a:ext>
+            </a:extLst>
+          </p:cNvPr>
+          <p:cNvSpPr txBox="1"/>
+          <p:nvPr/>
+        </p:nvSpPr>
+        <p:spPr>
+          <a:xfrm>
+            <a:off x="9197613" y="4935098"/>
+            <a:ext cx="1992064" cy="430887"/>
+          </a:xfrm>
+          <a:prstGeom prst="rect">
+            <a:avLst/>
+          </a:prstGeom>
+          <a:noFill/>
+        </p:spPr>
+        <p:txBody>
+          <a:bodyPr wrap="square" rtlCol="0">
+            <a:spAutoFit/>
+          </a:bodyPr>
+          <a:lstStyle/>
+          <a:p>
+            <a:pPr algn="ctr"/>
+            <a:r>
+              <a:rPr lang="en-US" sz="1100" dirty="0"/>
+              <a:t>Top 24% of artists represent 58.3% of the data</a:t>
+            </a:r>
+          </a:p>
+        </p:txBody>
+      </p:sp>
     </p:spTree>
     <p:extLst>
       <p:ext uri="{BB962C8B-B14F-4D97-AF65-F5344CB8AC3E}">
@@ -23459,13 +23638,13 @@
           <a:p>
             <a:r>
               <a:rPr lang="en-US" sz="1800" dirty="0"/>
-              <a:t>Mean = 333</a:t>
+              <a:t>Mean = 330</a:t>
             </a:r>
           </a:p>
           <a:p>
             <a:r>
               <a:rPr lang="en-US" sz="1800" dirty="0"/>
-              <a:t>Min = 1</a:t>
+              <a:t>Min = 5</a:t>
             </a:r>
           </a:p>
           <a:p>
@@ -23477,7 +23656,7 @@
           <a:p>
             <a:r>
               <a:rPr lang="en-US" sz="1800" dirty="0"/>
-              <a:t>50% of data within 216-407 tokens long</a:t>
+              <a:t>50% of data within 214-403 tokens long</a:t>
             </a:r>
           </a:p>
           <a:p>
@@ -24031,348 +24210,6 @@
           </a:ln>
         </p:spPr>
       </p:pic>
-      <p:pic>
-        <p:nvPicPr>
-          <p:cNvPr id="12" name="Picture 11" descr="Chart, box and whisker chart&#10;&#10;Description automatically generated">
-            <a:extLst>
-              <a:ext uri="{FF2B5EF4-FFF2-40B4-BE49-F238E27FC236}">
-                <a16:creationId xmlns:a16="http://schemas.microsoft.com/office/drawing/2014/main" id="{32316C92-6606-413D-8A3D-1C5216486006}"/>
-              </a:ext>
-            </a:extLst>
-          </p:cNvPr>
-          <p:cNvPicPr>
-            <a:picLocks noChangeAspect="1"/>
-          </p:cNvPicPr>
-          <p:nvPr/>
-        </p:nvPicPr>
-        <p:blipFill>
-          <a:blip r:embed="rId3"/>
-          <a:stretch>
-            <a:fillRect/>
-          </a:stretch>
-        </p:blipFill>
-        <p:spPr>
-          <a:xfrm>
-            <a:off x="7116722" y="1913966"/>
-            <a:ext cx="3235592" cy="2157061"/>
-          </a:xfrm>
-          <a:custGeom>
-            <a:avLst/>
-            <a:gdLst>
-              <a:gd name="connsiteX0" fmla="*/ 0 w 3235592"/>
-              <a:gd name="connsiteY0" fmla="*/ 0 h 2157061"/>
-              <a:gd name="connsiteX1" fmla="*/ 711830 w 3235592"/>
-              <a:gd name="connsiteY1" fmla="*/ 0 h 2157061"/>
-              <a:gd name="connsiteX2" fmla="*/ 1261881 w 3235592"/>
-              <a:gd name="connsiteY2" fmla="*/ 0 h 2157061"/>
-              <a:gd name="connsiteX3" fmla="*/ 1973711 w 3235592"/>
-              <a:gd name="connsiteY3" fmla="*/ 0 h 2157061"/>
-              <a:gd name="connsiteX4" fmla="*/ 2685541 w 3235592"/>
-              <a:gd name="connsiteY4" fmla="*/ 0 h 2157061"/>
-              <a:gd name="connsiteX5" fmla="*/ 3235592 w 3235592"/>
-              <a:gd name="connsiteY5" fmla="*/ 0 h 2157061"/>
-              <a:gd name="connsiteX6" fmla="*/ 3235592 w 3235592"/>
-              <a:gd name="connsiteY6" fmla="*/ 539265 h 2157061"/>
-              <a:gd name="connsiteX7" fmla="*/ 3235592 w 3235592"/>
-              <a:gd name="connsiteY7" fmla="*/ 1100101 h 2157061"/>
-              <a:gd name="connsiteX8" fmla="*/ 3235592 w 3235592"/>
-              <a:gd name="connsiteY8" fmla="*/ 1617796 h 2157061"/>
-              <a:gd name="connsiteX9" fmla="*/ 3235592 w 3235592"/>
-              <a:gd name="connsiteY9" fmla="*/ 2157061 h 2157061"/>
-              <a:gd name="connsiteX10" fmla="*/ 2653185 w 3235592"/>
-              <a:gd name="connsiteY10" fmla="*/ 2157061 h 2157061"/>
-              <a:gd name="connsiteX11" fmla="*/ 1941355 w 3235592"/>
-              <a:gd name="connsiteY11" fmla="*/ 2157061 h 2157061"/>
-              <a:gd name="connsiteX12" fmla="*/ 1261881 w 3235592"/>
-              <a:gd name="connsiteY12" fmla="*/ 2157061 h 2157061"/>
-              <a:gd name="connsiteX13" fmla="*/ 679474 w 3235592"/>
-              <a:gd name="connsiteY13" fmla="*/ 2157061 h 2157061"/>
-              <a:gd name="connsiteX14" fmla="*/ 0 w 3235592"/>
-              <a:gd name="connsiteY14" fmla="*/ 2157061 h 2157061"/>
-              <a:gd name="connsiteX15" fmla="*/ 0 w 3235592"/>
-              <a:gd name="connsiteY15" fmla="*/ 1660937 h 2157061"/>
-              <a:gd name="connsiteX16" fmla="*/ 0 w 3235592"/>
-              <a:gd name="connsiteY16" fmla="*/ 1143242 h 2157061"/>
-              <a:gd name="connsiteX17" fmla="*/ 0 w 3235592"/>
-              <a:gd name="connsiteY17" fmla="*/ 647118 h 2157061"/>
-              <a:gd name="connsiteX18" fmla="*/ 0 w 3235592"/>
-              <a:gd name="connsiteY18" fmla="*/ 0 h 2157061"/>
-            </a:gdLst>
-            <a:ahLst/>
-            <a:cxnLst>
-              <a:cxn ang="0">
-                <a:pos x="connsiteX0" y="connsiteY0"/>
-              </a:cxn>
-              <a:cxn ang="0">
-                <a:pos x="connsiteX1" y="connsiteY1"/>
-              </a:cxn>
-              <a:cxn ang="0">
-                <a:pos x="connsiteX2" y="connsiteY2"/>
-              </a:cxn>
-              <a:cxn ang="0">
-                <a:pos x="connsiteX3" y="connsiteY3"/>
-              </a:cxn>
-              <a:cxn ang="0">
-                <a:pos x="connsiteX4" y="connsiteY4"/>
-              </a:cxn>
-              <a:cxn ang="0">
-                <a:pos x="connsiteX5" y="connsiteY5"/>
-              </a:cxn>
-              <a:cxn ang="0">
-                <a:pos x="connsiteX6" y="connsiteY6"/>
-              </a:cxn>
-              <a:cxn ang="0">
-                <a:pos x="connsiteX7" y="connsiteY7"/>
-              </a:cxn>
-              <a:cxn ang="0">
-                <a:pos x="connsiteX8" y="connsiteY8"/>
-              </a:cxn>
-              <a:cxn ang="0">
-                <a:pos x="connsiteX9" y="connsiteY9"/>
-              </a:cxn>
-              <a:cxn ang="0">
-                <a:pos x="connsiteX10" y="connsiteY10"/>
-              </a:cxn>
-              <a:cxn ang="0">
-                <a:pos x="connsiteX11" y="connsiteY11"/>
-              </a:cxn>
-              <a:cxn ang="0">
-                <a:pos x="connsiteX12" y="connsiteY12"/>
-              </a:cxn>
-              <a:cxn ang="0">
-                <a:pos x="connsiteX13" y="connsiteY13"/>
-              </a:cxn>
-              <a:cxn ang="0">
-                <a:pos x="connsiteX14" y="connsiteY14"/>
-              </a:cxn>
-              <a:cxn ang="0">
-                <a:pos x="connsiteX15" y="connsiteY15"/>
-              </a:cxn>
-              <a:cxn ang="0">
-                <a:pos x="connsiteX16" y="connsiteY16"/>
-              </a:cxn>
-              <a:cxn ang="0">
-                <a:pos x="connsiteX17" y="connsiteY17"/>
-              </a:cxn>
-              <a:cxn ang="0">
-                <a:pos x="connsiteX18" y="connsiteY18"/>
-              </a:cxn>
-            </a:cxnLst>
-            <a:rect l="l" t="t" r="r" b="b"/>
-            <a:pathLst>
-              <a:path w="3235592" h="2157061" fill="none" extrusionOk="0">
-                <a:moveTo>
-                  <a:pt x="0" y="0"/>
-                </a:moveTo>
-                <a:cubicBezTo>
-                  <a:pt x="315863" y="34395"/>
-                  <a:pt x="564466" y="7933"/>
-                  <a:pt x="711830" y="0"/>
-                </a:cubicBezTo>
-                <a:cubicBezTo>
-                  <a:pt x="859194" y="-7933"/>
-                  <a:pt x="1004841" y="-13104"/>
-                  <a:pt x="1261881" y="0"/>
-                </a:cubicBezTo>
-                <a:cubicBezTo>
-                  <a:pt x="1518921" y="13104"/>
-                  <a:pt x="1792572" y="-5575"/>
-                  <a:pt x="1973711" y="0"/>
-                </a:cubicBezTo>
-                <a:cubicBezTo>
-                  <a:pt x="2154850" y="5575"/>
-                  <a:pt x="2398453" y="-33500"/>
-                  <a:pt x="2685541" y="0"/>
-                </a:cubicBezTo>
-                <a:cubicBezTo>
-                  <a:pt x="2972629" y="33500"/>
-                  <a:pt x="3097056" y="24455"/>
-                  <a:pt x="3235592" y="0"/>
-                </a:cubicBezTo>
-                <a:cubicBezTo>
-                  <a:pt x="3247194" y="163186"/>
-                  <a:pt x="3231631" y="401378"/>
-                  <a:pt x="3235592" y="539265"/>
-                </a:cubicBezTo>
-                <a:cubicBezTo>
-                  <a:pt x="3239553" y="677152"/>
-                  <a:pt x="3247617" y="912528"/>
-                  <a:pt x="3235592" y="1100101"/>
-                </a:cubicBezTo>
-                <a:cubicBezTo>
-                  <a:pt x="3223567" y="1287674"/>
-                  <a:pt x="3248393" y="1477097"/>
-                  <a:pt x="3235592" y="1617796"/>
-                </a:cubicBezTo>
-                <a:cubicBezTo>
-                  <a:pt x="3222791" y="1758495"/>
-                  <a:pt x="3224764" y="2036941"/>
-                  <a:pt x="3235592" y="2157061"/>
-                </a:cubicBezTo>
-                <a:cubicBezTo>
-                  <a:pt x="2959020" y="2176717"/>
-                  <a:pt x="2913911" y="2164479"/>
-                  <a:pt x="2653185" y="2157061"/>
-                </a:cubicBezTo>
-                <a:cubicBezTo>
-                  <a:pt x="2392459" y="2149643"/>
-                  <a:pt x="2266885" y="2158108"/>
-                  <a:pt x="1941355" y="2157061"/>
-                </a:cubicBezTo>
-                <a:cubicBezTo>
-                  <a:pt x="1615825" y="2156015"/>
-                  <a:pt x="1486211" y="2190003"/>
-                  <a:pt x="1261881" y="2157061"/>
-                </a:cubicBezTo>
-                <a:cubicBezTo>
-                  <a:pt x="1037551" y="2124119"/>
-                  <a:pt x="910399" y="2153991"/>
-                  <a:pt x="679474" y="2157061"/>
-                </a:cubicBezTo>
-                <a:cubicBezTo>
-                  <a:pt x="448549" y="2160131"/>
-                  <a:pt x="314199" y="2158000"/>
-                  <a:pt x="0" y="2157061"/>
-                </a:cubicBezTo>
-                <a:cubicBezTo>
-                  <a:pt x="-22843" y="2051749"/>
-                  <a:pt x="3503" y="1838676"/>
-                  <a:pt x="0" y="1660937"/>
-                </a:cubicBezTo>
-                <a:cubicBezTo>
-                  <a:pt x="-3503" y="1483198"/>
-                  <a:pt x="15837" y="1370881"/>
-                  <a:pt x="0" y="1143242"/>
-                </a:cubicBezTo>
-                <a:cubicBezTo>
-                  <a:pt x="-15837" y="915603"/>
-                  <a:pt x="21047" y="760882"/>
-                  <a:pt x="0" y="647118"/>
-                </a:cubicBezTo>
-                <a:cubicBezTo>
-                  <a:pt x="-21047" y="533354"/>
-                  <a:pt x="-10351" y="190089"/>
-                  <a:pt x="0" y="0"/>
-                </a:cubicBezTo>
-                <a:close/>
-              </a:path>
-              <a:path w="3235592" h="2157061" stroke="0" extrusionOk="0">
-                <a:moveTo>
-                  <a:pt x="0" y="0"/>
-                </a:moveTo>
-                <a:cubicBezTo>
-                  <a:pt x="157588" y="-24566"/>
-                  <a:pt x="461788" y="-7011"/>
-                  <a:pt x="647118" y="0"/>
-                </a:cubicBezTo>
-                <a:cubicBezTo>
-                  <a:pt x="832448" y="7011"/>
-                  <a:pt x="1065094" y="-4790"/>
-                  <a:pt x="1294237" y="0"/>
-                </a:cubicBezTo>
-                <a:cubicBezTo>
-                  <a:pt x="1523380" y="4790"/>
-                  <a:pt x="1656964" y="11945"/>
-                  <a:pt x="1876643" y="0"/>
-                </a:cubicBezTo>
-                <a:cubicBezTo>
-                  <a:pt x="2096322" y="-11945"/>
-                  <a:pt x="2271621" y="-7785"/>
-                  <a:pt x="2588474" y="0"/>
-                </a:cubicBezTo>
-                <a:cubicBezTo>
-                  <a:pt x="2905327" y="7785"/>
-                  <a:pt x="3008410" y="9738"/>
-                  <a:pt x="3235592" y="0"/>
-                </a:cubicBezTo>
-                <a:cubicBezTo>
-                  <a:pt x="3248543" y="261950"/>
-                  <a:pt x="3244770" y="368536"/>
-                  <a:pt x="3235592" y="560836"/>
-                </a:cubicBezTo>
-                <a:cubicBezTo>
-                  <a:pt x="3226414" y="753136"/>
-                  <a:pt x="3215185" y="964789"/>
-                  <a:pt x="3235592" y="1121672"/>
-                </a:cubicBezTo>
-                <a:cubicBezTo>
-                  <a:pt x="3255999" y="1278555"/>
-                  <a:pt x="3213026" y="1533660"/>
-                  <a:pt x="3235592" y="1660937"/>
-                </a:cubicBezTo>
-                <a:cubicBezTo>
-                  <a:pt x="3258158" y="1788215"/>
-                  <a:pt x="3252044" y="2041009"/>
-                  <a:pt x="3235592" y="2157061"/>
-                </a:cubicBezTo>
-                <a:cubicBezTo>
-                  <a:pt x="3036987" y="2187309"/>
-                  <a:pt x="2840672" y="2159145"/>
-                  <a:pt x="2588474" y="2157061"/>
-                </a:cubicBezTo>
-                <a:cubicBezTo>
-                  <a:pt x="2336276" y="2154977"/>
-                  <a:pt x="2100928" y="2163576"/>
-                  <a:pt x="1876643" y="2157061"/>
-                </a:cubicBezTo>
-                <a:cubicBezTo>
-                  <a:pt x="1652358" y="2150546"/>
-                  <a:pt x="1460083" y="2180667"/>
-                  <a:pt x="1197169" y="2157061"/>
-                </a:cubicBezTo>
-                <a:cubicBezTo>
-                  <a:pt x="934255" y="2133455"/>
-                  <a:pt x="834510" y="2178179"/>
-                  <a:pt x="647118" y="2157061"/>
-                </a:cubicBezTo>
-                <a:cubicBezTo>
-                  <a:pt x="459726" y="2135943"/>
-                  <a:pt x="224878" y="2163041"/>
-                  <a:pt x="0" y="2157061"/>
-                </a:cubicBezTo>
-                <a:cubicBezTo>
-                  <a:pt x="4440" y="1981535"/>
-                  <a:pt x="13584" y="1809004"/>
-                  <a:pt x="0" y="1596225"/>
-                </a:cubicBezTo>
-                <a:cubicBezTo>
-                  <a:pt x="-13584" y="1383446"/>
-                  <a:pt x="-4555" y="1327787"/>
-                  <a:pt x="0" y="1121672"/>
-                </a:cubicBezTo>
-                <a:cubicBezTo>
-                  <a:pt x="4555" y="915557"/>
-                  <a:pt x="4132" y="819501"/>
-                  <a:pt x="0" y="560836"/>
-                </a:cubicBezTo>
-                <a:cubicBezTo>
-                  <a:pt x="-4132" y="302171"/>
-                  <a:pt x="19924" y="133797"/>
-                  <a:pt x="0" y="0"/>
-                </a:cubicBezTo>
-                <a:close/>
-              </a:path>
-            </a:pathLst>
-          </a:custGeom>
-          <a:ln w="12700">
-            <a:solidFill>
-              <a:schemeClr val="accent2"/>
-            </a:solidFill>
-            <a:extLst>
-              <a:ext uri="{C807C97D-BFC1-408E-A445-0C87EB9F89A2}">
-                <ask:lineSketchStyleProps xmlns:ask="http://schemas.microsoft.com/office/drawing/2018/sketchyshapes" sd="1231067364">
-                  <a:prstGeom prst="rect">
-                    <a:avLst/>
-                  </a:prstGeom>
-                  <ask:type>
-                    <ask:lineSketchFreehand/>
-                  </ask:type>
-                </ask:lineSketchStyleProps>
-              </a:ext>
-            </a:extLst>
-          </a:ln>
-        </p:spPr>
-      </p:pic>
       <p:sp>
         <p:nvSpPr>
           <p:cNvPr id="13" name="TextBox 12">
@@ -24412,6 +24249,337 @@
           </a:p>
         </p:txBody>
       </p:sp>
+      <p:pic>
+        <p:nvPicPr>
+          <p:cNvPr id="14" name="Picture 13" descr="Chart, box and whisker chart&#10;&#10;Description automatically generated">
+            <a:extLst>
+              <a:ext uri="{FF2B5EF4-FFF2-40B4-BE49-F238E27FC236}">
+                <a16:creationId xmlns:a16="http://schemas.microsoft.com/office/drawing/2014/main" id="{12375022-21A8-448E-954E-DC9F9738BF2D}"/>
+              </a:ext>
+            </a:extLst>
+          </p:cNvPr>
+          <p:cNvPicPr>
+            <a:picLocks noChangeAspect="1"/>
+          </p:cNvPicPr>
+          <p:nvPr/>
+        </p:nvPicPr>
+        <p:blipFill rotWithShape="1">
+          <a:blip r:embed="rId3"/>
+          <a:srcRect t="2123" b="3450"/>
+          <a:stretch/>
+        </p:blipFill>
+        <p:spPr>
+          <a:xfrm>
+            <a:off x="6948741" y="1899548"/>
+            <a:ext cx="3477478" cy="2189104"/>
+          </a:xfrm>
+          <a:custGeom>
+            <a:avLst/>
+            <a:gdLst>
+              <a:gd name="connsiteX0" fmla="*/ 0 w 3477478"/>
+              <a:gd name="connsiteY0" fmla="*/ 0 h 2189104"/>
+              <a:gd name="connsiteX1" fmla="*/ 625946 w 3477478"/>
+              <a:gd name="connsiteY1" fmla="*/ 0 h 2189104"/>
+              <a:gd name="connsiteX2" fmla="*/ 1286667 w 3477478"/>
+              <a:gd name="connsiteY2" fmla="*/ 0 h 2189104"/>
+              <a:gd name="connsiteX3" fmla="*/ 1982162 w 3477478"/>
+              <a:gd name="connsiteY3" fmla="*/ 0 h 2189104"/>
+              <a:gd name="connsiteX4" fmla="*/ 2712433 w 3477478"/>
+              <a:gd name="connsiteY4" fmla="*/ 0 h 2189104"/>
+              <a:gd name="connsiteX5" fmla="*/ 3477478 w 3477478"/>
+              <a:gd name="connsiteY5" fmla="*/ 0 h 2189104"/>
+              <a:gd name="connsiteX6" fmla="*/ 3477478 w 3477478"/>
+              <a:gd name="connsiteY6" fmla="*/ 591058 h 2189104"/>
+              <a:gd name="connsiteX7" fmla="*/ 3477478 w 3477478"/>
+              <a:gd name="connsiteY7" fmla="*/ 1160225 h 2189104"/>
+              <a:gd name="connsiteX8" fmla="*/ 3477478 w 3477478"/>
+              <a:gd name="connsiteY8" fmla="*/ 2189104 h 2189104"/>
+              <a:gd name="connsiteX9" fmla="*/ 2712433 w 3477478"/>
+              <a:gd name="connsiteY9" fmla="*/ 2189104 h 2189104"/>
+              <a:gd name="connsiteX10" fmla="*/ 1982162 w 3477478"/>
+              <a:gd name="connsiteY10" fmla="*/ 2189104 h 2189104"/>
+              <a:gd name="connsiteX11" fmla="*/ 1390991 w 3477478"/>
+              <a:gd name="connsiteY11" fmla="*/ 2189104 h 2189104"/>
+              <a:gd name="connsiteX12" fmla="*/ 799820 w 3477478"/>
+              <a:gd name="connsiteY12" fmla="*/ 2189104 h 2189104"/>
+              <a:gd name="connsiteX13" fmla="*/ 0 w 3477478"/>
+              <a:gd name="connsiteY13" fmla="*/ 2189104 h 2189104"/>
+              <a:gd name="connsiteX14" fmla="*/ 0 w 3477478"/>
+              <a:gd name="connsiteY14" fmla="*/ 1598046 h 2189104"/>
+              <a:gd name="connsiteX15" fmla="*/ 0 w 3477478"/>
+              <a:gd name="connsiteY15" fmla="*/ 1116443 h 2189104"/>
+              <a:gd name="connsiteX16" fmla="*/ 0 w 3477478"/>
+              <a:gd name="connsiteY16" fmla="*/ 525385 h 2189104"/>
+              <a:gd name="connsiteX17" fmla="*/ 0 w 3477478"/>
+              <a:gd name="connsiteY17" fmla="*/ 0 h 2189104"/>
+            </a:gdLst>
+            <a:ahLst/>
+            <a:cxnLst>
+              <a:cxn ang="0">
+                <a:pos x="connsiteX0" y="connsiteY0"/>
+              </a:cxn>
+              <a:cxn ang="0">
+                <a:pos x="connsiteX1" y="connsiteY1"/>
+              </a:cxn>
+              <a:cxn ang="0">
+                <a:pos x="connsiteX2" y="connsiteY2"/>
+              </a:cxn>
+              <a:cxn ang="0">
+                <a:pos x="connsiteX3" y="connsiteY3"/>
+              </a:cxn>
+              <a:cxn ang="0">
+                <a:pos x="connsiteX4" y="connsiteY4"/>
+              </a:cxn>
+              <a:cxn ang="0">
+                <a:pos x="connsiteX5" y="connsiteY5"/>
+              </a:cxn>
+              <a:cxn ang="0">
+                <a:pos x="connsiteX6" y="connsiteY6"/>
+              </a:cxn>
+              <a:cxn ang="0">
+                <a:pos x="connsiteX7" y="connsiteY7"/>
+              </a:cxn>
+              <a:cxn ang="0">
+                <a:pos x="connsiteX8" y="connsiteY8"/>
+              </a:cxn>
+              <a:cxn ang="0">
+                <a:pos x="connsiteX9" y="connsiteY9"/>
+              </a:cxn>
+              <a:cxn ang="0">
+                <a:pos x="connsiteX10" y="connsiteY10"/>
+              </a:cxn>
+              <a:cxn ang="0">
+                <a:pos x="connsiteX11" y="connsiteY11"/>
+              </a:cxn>
+              <a:cxn ang="0">
+                <a:pos x="connsiteX12" y="connsiteY12"/>
+              </a:cxn>
+              <a:cxn ang="0">
+                <a:pos x="connsiteX13" y="connsiteY13"/>
+              </a:cxn>
+              <a:cxn ang="0">
+                <a:pos x="connsiteX14" y="connsiteY14"/>
+              </a:cxn>
+              <a:cxn ang="0">
+                <a:pos x="connsiteX15" y="connsiteY15"/>
+              </a:cxn>
+              <a:cxn ang="0">
+                <a:pos x="connsiteX16" y="connsiteY16"/>
+              </a:cxn>
+              <a:cxn ang="0">
+                <a:pos x="connsiteX17" y="connsiteY17"/>
+              </a:cxn>
+            </a:cxnLst>
+            <a:rect l="l" t="t" r="r" b="b"/>
+            <a:pathLst>
+              <a:path w="3477478" h="2189104" fill="none" extrusionOk="0">
+                <a:moveTo>
+                  <a:pt x="0" y="0"/>
+                </a:moveTo>
+                <a:cubicBezTo>
+                  <a:pt x="275714" y="7944"/>
+                  <a:pt x="433996" y="-29876"/>
+                  <a:pt x="625946" y="0"/>
+                </a:cubicBezTo>
+                <a:cubicBezTo>
+                  <a:pt x="817896" y="29876"/>
+                  <a:pt x="1131537" y="22285"/>
+                  <a:pt x="1286667" y="0"/>
+                </a:cubicBezTo>
+                <a:cubicBezTo>
+                  <a:pt x="1441797" y="-22285"/>
+                  <a:pt x="1712390" y="11218"/>
+                  <a:pt x="1982162" y="0"/>
+                </a:cubicBezTo>
+                <a:cubicBezTo>
+                  <a:pt x="2251934" y="-11218"/>
+                  <a:pt x="2545795" y="28991"/>
+                  <a:pt x="2712433" y="0"/>
+                </a:cubicBezTo>
+                <a:cubicBezTo>
+                  <a:pt x="2879071" y="-28991"/>
+                  <a:pt x="3167893" y="30264"/>
+                  <a:pt x="3477478" y="0"/>
+                </a:cubicBezTo>
+                <a:cubicBezTo>
+                  <a:pt x="3481291" y="140857"/>
+                  <a:pt x="3475839" y="317254"/>
+                  <a:pt x="3477478" y="591058"/>
+                </a:cubicBezTo>
+                <a:cubicBezTo>
+                  <a:pt x="3479117" y="864862"/>
+                  <a:pt x="3488202" y="960391"/>
+                  <a:pt x="3477478" y="1160225"/>
+                </a:cubicBezTo>
+                <a:cubicBezTo>
+                  <a:pt x="3466754" y="1360059"/>
+                  <a:pt x="3495515" y="1807794"/>
+                  <a:pt x="3477478" y="2189104"/>
+                </a:cubicBezTo>
+                <a:cubicBezTo>
+                  <a:pt x="3304590" y="2197996"/>
+                  <a:pt x="3038501" y="2193684"/>
+                  <a:pt x="2712433" y="2189104"/>
+                </a:cubicBezTo>
+                <a:cubicBezTo>
+                  <a:pt x="2386366" y="2184524"/>
+                  <a:pt x="2190578" y="2189984"/>
+                  <a:pt x="1982162" y="2189104"/>
+                </a:cubicBezTo>
+                <a:cubicBezTo>
+                  <a:pt x="1773746" y="2188224"/>
+                  <a:pt x="1619613" y="2215946"/>
+                  <a:pt x="1390991" y="2189104"/>
+                </a:cubicBezTo>
+                <a:cubicBezTo>
+                  <a:pt x="1162369" y="2162262"/>
+                  <a:pt x="1000311" y="2175411"/>
+                  <a:pt x="799820" y="2189104"/>
+                </a:cubicBezTo>
+                <a:cubicBezTo>
+                  <a:pt x="599329" y="2202797"/>
+                  <a:pt x="376902" y="2179275"/>
+                  <a:pt x="0" y="2189104"/>
+                </a:cubicBezTo>
+                <a:cubicBezTo>
+                  <a:pt x="27257" y="1949527"/>
+                  <a:pt x="-7300" y="1808160"/>
+                  <a:pt x="0" y="1598046"/>
+                </a:cubicBezTo>
+                <a:cubicBezTo>
+                  <a:pt x="7300" y="1387932"/>
+                  <a:pt x="-1010" y="1234581"/>
+                  <a:pt x="0" y="1116443"/>
+                </a:cubicBezTo>
+                <a:cubicBezTo>
+                  <a:pt x="1010" y="998305"/>
+                  <a:pt x="11779" y="739816"/>
+                  <a:pt x="0" y="525385"/>
+                </a:cubicBezTo>
+                <a:cubicBezTo>
+                  <a:pt x="-11779" y="310954"/>
+                  <a:pt x="13416" y="215052"/>
+                  <a:pt x="0" y="0"/>
+                </a:cubicBezTo>
+                <a:close/>
+              </a:path>
+              <a:path w="3477478" h="2189104" stroke="0" extrusionOk="0">
+                <a:moveTo>
+                  <a:pt x="0" y="0"/>
+                </a:moveTo>
+                <a:cubicBezTo>
+                  <a:pt x="306884" y="-19708"/>
+                  <a:pt x="556708" y="-8147"/>
+                  <a:pt x="730270" y="0"/>
+                </a:cubicBezTo>
+                <a:cubicBezTo>
+                  <a:pt x="903832" y="8147"/>
+                  <a:pt x="1133720" y="-3192"/>
+                  <a:pt x="1390991" y="0"/>
+                </a:cubicBezTo>
+                <a:cubicBezTo>
+                  <a:pt x="1648262" y="3192"/>
+                  <a:pt x="1862176" y="5213"/>
+                  <a:pt x="2086487" y="0"/>
+                </a:cubicBezTo>
+                <a:cubicBezTo>
+                  <a:pt x="2310798" y="-5213"/>
+                  <a:pt x="2586190" y="30667"/>
+                  <a:pt x="2712433" y="0"/>
+                </a:cubicBezTo>
+                <a:cubicBezTo>
+                  <a:pt x="2838676" y="-30667"/>
+                  <a:pt x="3203034" y="717"/>
+                  <a:pt x="3477478" y="0"/>
+                </a:cubicBezTo>
+                <a:cubicBezTo>
+                  <a:pt x="3464984" y="116975"/>
+                  <a:pt x="3463764" y="309730"/>
+                  <a:pt x="3477478" y="503494"/>
+                </a:cubicBezTo>
+                <a:cubicBezTo>
+                  <a:pt x="3491192" y="697258"/>
+                  <a:pt x="3498341" y="814758"/>
+                  <a:pt x="3477478" y="1050770"/>
+                </a:cubicBezTo>
+                <a:cubicBezTo>
+                  <a:pt x="3456615" y="1286782"/>
+                  <a:pt x="3455169" y="1418850"/>
+                  <a:pt x="3477478" y="1554264"/>
+                </a:cubicBezTo>
+                <a:cubicBezTo>
+                  <a:pt x="3499787" y="1689678"/>
+                  <a:pt x="3506250" y="1890753"/>
+                  <a:pt x="3477478" y="2189104"/>
+                </a:cubicBezTo>
+                <a:cubicBezTo>
+                  <a:pt x="3245999" y="2190853"/>
+                  <a:pt x="3003630" y="2205118"/>
+                  <a:pt x="2816757" y="2189104"/>
+                </a:cubicBezTo>
+                <a:cubicBezTo>
+                  <a:pt x="2629884" y="2173090"/>
+                  <a:pt x="2413450" y="2178520"/>
+                  <a:pt x="2190811" y="2189104"/>
+                </a:cubicBezTo>
+                <a:cubicBezTo>
+                  <a:pt x="1968172" y="2199688"/>
+                  <a:pt x="1697074" y="2207160"/>
+                  <a:pt x="1530090" y="2189104"/>
+                </a:cubicBezTo>
+                <a:cubicBezTo>
+                  <a:pt x="1363106" y="2171048"/>
+                  <a:pt x="1120737" y="2175273"/>
+                  <a:pt x="765045" y="2189104"/>
+                </a:cubicBezTo>
+                <a:cubicBezTo>
+                  <a:pt x="409354" y="2202935"/>
+                  <a:pt x="260557" y="2224208"/>
+                  <a:pt x="0" y="2189104"/>
+                </a:cubicBezTo>
+                <a:cubicBezTo>
+                  <a:pt x="6065" y="1964110"/>
+                  <a:pt x="-6196" y="1874443"/>
+                  <a:pt x="0" y="1663719"/>
+                </a:cubicBezTo>
+                <a:cubicBezTo>
+                  <a:pt x="6196" y="1452995"/>
+                  <a:pt x="-9912" y="1390659"/>
+                  <a:pt x="0" y="1182116"/>
+                </a:cubicBezTo>
+                <a:cubicBezTo>
+                  <a:pt x="9912" y="973573"/>
+                  <a:pt x="-16327" y="912453"/>
+                  <a:pt x="0" y="700513"/>
+                </a:cubicBezTo>
+                <a:cubicBezTo>
+                  <a:pt x="16327" y="488573"/>
+                  <a:pt x="17971" y="268442"/>
+                  <a:pt x="0" y="0"/>
+                </a:cubicBezTo>
+                <a:close/>
+              </a:path>
+            </a:pathLst>
+          </a:custGeom>
+          <a:ln w="12700">
+            <a:solidFill>
+              <a:schemeClr val="accent1"/>
+            </a:solidFill>
+            <a:extLst>
+              <a:ext uri="{C807C97D-BFC1-408E-A445-0C87EB9F89A2}">
+                <ask:lineSketchStyleProps xmlns:ask="http://schemas.microsoft.com/office/drawing/2018/sketchyshapes" sd="2512980468">
+                  <a:prstGeom prst="rect">
+                    <a:avLst/>
+                  </a:prstGeom>
+                  <ask:type>
+                    <ask:lineSketchFreehand/>
+                  </ask:type>
+                </ask:lineSketchStyleProps>
+              </a:ext>
+            </a:extLst>
+          </a:ln>
+        </p:spPr>
+      </p:pic>
     </p:spTree>
     <p:extLst>
       <p:ext uri="{BB962C8B-B14F-4D97-AF65-F5344CB8AC3E}">
@@ -24685,10 +24853,10 @@
       </p:sp>
       <p:pic>
         <p:nvPicPr>
-          <p:cNvPr id="8" name="Picture 7" descr="Chart, bar chart&#10;&#10;Description automatically generated">
+          <p:cNvPr id="9" name="Picture 8" descr="Chart, bar chart&#10;&#10;Description automatically generated">
             <a:extLst>
               <a:ext uri="{FF2B5EF4-FFF2-40B4-BE49-F238E27FC236}">
-                <a16:creationId xmlns:a16="http://schemas.microsoft.com/office/drawing/2014/main" id="{AAF2F49F-F33B-4D61-BE19-12D78C72B360}"/>
+                <a16:creationId xmlns:a16="http://schemas.microsoft.com/office/drawing/2014/main" id="{5C286CA0-5674-4E74-8CD9-D8FA3E38F749}"/>
               </a:ext>
             </a:extLst>
           </p:cNvPr>
@@ -24699,36 +24867,6 @@
         </p:nvPicPr>
         <p:blipFill>
           <a:blip r:embed="rId3"/>
-          <a:stretch>
-            <a:fillRect/>
-          </a:stretch>
-        </p:blipFill>
-        <p:spPr>
-          <a:xfrm>
-            <a:off x="6548602" y="2317707"/>
-            <a:ext cx="4693163" cy="3128775"/>
-          </a:xfrm>
-          <a:prstGeom prst="rect">
-            <a:avLst/>
-          </a:prstGeom>
-        </p:spPr>
-      </p:pic>
-      <p:pic>
-        <p:nvPicPr>
-          <p:cNvPr id="9" name="Picture 8" descr="Chart, bar chart&#10;&#10;Description automatically generated">
-            <a:extLst>
-              <a:ext uri="{FF2B5EF4-FFF2-40B4-BE49-F238E27FC236}">
-                <a16:creationId xmlns:a16="http://schemas.microsoft.com/office/drawing/2014/main" id="{5C286CA0-5674-4E74-8CD9-D8FA3E38F749}"/>
-              </a:ext>
-            </a:extLst>
-          </p:cNvPr>
-          <p:cNvPicPr>
-            <a:picLocks noChangeAspect="1"/>
-          </p:cNvPicPr>
-          <p:nvPr/>
-        </p:nvPicPr>
-        <p:blipFill>
-          <a:blip r:embed="rId4"/>
           <a:stretch>
             <a:fillRect/>
           </a:stretch>
@@ -24825,6 +24963,36 @@
           </a:fontRef>
         </p:style>
       </p:cxnSp>
+      <p:pic>
+        <p:nvPicPr>
+          <p:cNvPr id="19" name="Picture 18" descr="Chart, bar chart&#10;&#10;Description automatically generated">
+            <a:extLst>
+              <a:ext uri="{FF2B5EF4-FFF2-40B4-BE49-F238E27FC236}">
+                <a16:creationId xmlns:a16="http://schemas.microsoft.com/office/drawing/2014/main" id="{AC9231EC-6BC3-49E9-896F-640FBF6CAFB9}"/>
+              </a:ext>
+            </a:extLst>
+          </p:cNvPr>
+          <p:cNvPicPr>
+            <a:picLocks noChangeAspect="1"/>
+          </p:cNvPicPr>
+          <p:nvPr/>
+        </p:nvPicPr>
+        <p:blipFill>
+          <a:blip r:embed="rId4"/>
+          <a:stretch>
+            <a:fillRect/>
+          </a:stretch>
+        </p:blipFill>
+        <p:spPr>
+          <a:xfrm>
+            <a:off x="6545036" y="2262677"/>
+            <a:ext cx="4890160" cy="3260106"/>
+          </a:xfrm>
+          <a:prstGeom prst="rect">
+            <a:avLst/>
+          </a:prstGeom>
+        </p:spPr>
+      </p:pic>
       <p:cxnSp>
         <p:nvCxnSpPr>
           <p:cNvPr id="14" name="Straight Arrow Connector 13">
@@ -24841,7 +25009,7 @@
         </p:nvCxnSpPr>
         <p:spPr>
           <a:xfrm flipV="1">
-            <a:off x="7536421" y="5322449"/>
+            <a:off x="7571591" y="5409484"/>
             <a:ext cx="0" cy="318421"/>
           </a:xfrm>
           <a:prstGeom prst="straightConnector1">
@@ -24885,7 +25053,7 @@
         </p:nvCxnSpPr>
         <p:spPr>
           <a:xfrm flipV="1">
-            <a:off x="9718229" y="5389829"/>
+            <a:off x="9835460" y="5500310"/>
             <a:ext cx="0" cy="318421"/>
           </a:xfrm>
           <a:prstGeom prst="straightConnector1">
@@ -24929,7 +25097,7 @@
         </p:nvCxnSpPr>
         <p:spPr>
           <a:xfrm flipV="1">
-            <a:off x="7362756" y="5454993"/>
+            <a:off x="7392064" y="5522783"/>
             <a:ext cx="0" cy="370934"/>
           </a:xfrm>
           <a:prstGeom prst="straightConnector1">
@@ -33542,31 +33710,7 @@
             </a:pPr>
             <a:r>
               <a:rPr lang="en-US" dirty="0"/>
-              <a:t>These characteristics clearly apply to a few central figures</a:t>
-            </a:r>
-          </a:p>
-          <a:p>
-            <a:pPr marL="0" indent="0">
-              <a:lnSpc>
-                <a:spcPct val="100000"/>
-              </a:lnSpc>
-              <a:spcBef>
-                <a:spcPts val="500"/>
-              </a:spcBef>
-              <a:buNone/>
-            </a:pPr>
-            <a:endParaRPr lang="en-US" dirty="0"/>
-          </a:p>
-          <a:p>
-            <a:pPr marL="0" indent="0">
-              <a:lnSpc>
-                <a:spcPct val="100000"/>
-              </a:lnSpc>
-              <a:buNone/>
-            </a:pPr>
-            <a:r>
-              <a:rPr lang="en-US" dirty="0"/>
-              <a:t>But do they apply to all artists?</a:t>
+              <a:t>Do these characteristics apply across the whole genre?</a:t>
             </a:r>
           </a:p>
           <a:p>
@@ -34481,7 +34625,7 @@
             <p:ph idx="1"/>
             <p:extLst>
               <p:ext uri="{D42A27DB-BD31-4B8C-83A1-F6EECF244321}">
-                <p14:modId xmlns:p14="http://schemas.microsoft.com/office/powerpoint/2010/main" val="1711335020"/>
+                <p14:modId xmlns:p14="http://schemas.microsoft.com/office/powerpoint/2010/main" val="2879195847"/>
               </p:ext>
             </p:extLst>
           </p:nvPr>
@@ -36596,21 +36740,21 @@
 </file>
 
 <file path=customXml/item1.xml><?xml version="1.0" encoding="utf-8"?>
+<?mso-contentType ?>
+<FormTemplates xmlns="http://schemas.microsoft.com/sharepoint/v3/contenttype/forms">
+  <Display>DocumentLibraryForm</Display>
+  <Edit>DocumentLibraryForm</Edit>
+  <New>DocumentLibraryForm</New>
+</FormTemplates>
+</file>
+
+<file path=customXml/item2.xml><?xml version="1.0" encoding="utf-8"?>
 <p:properties xmlns:p="http://schemas.microsoft.com/office/2006/metadata/properties" xmlns:xsi="http://www.w3.org/2001/XMLSchema-instance" xmlns:pc="http://schemas.microsoft.com/office/infopath/2007/PartnerControls">
   <documentManagement>
     <Status xmlns="71af3243-3dd4-4a8d-8c0d-dd76da1f02a5">Not started</Status>
     <MediaServiceKeyPoints xmlns="71af3243-3dd4-4a8d-8c0d-dd76da1f02a5" xsi:nil="true"/>
   </documentManagement>
 </p:properties>
-</file>
-
-<file path=customXml/item2.xml><?xml version="1.0" encoding="utf-8"?>
-<?mso-contentType ?>
-<FormTemplates xmlns="http://schemas.microsoft.com/sharepoint/v3/contenttype/forms">
-  <Display>DocumentLibraryForm</Display>
-  <Edit>DocumentLibraryForm</Edit>
-  <New>DocumentLibraryForm</New>
-</FormTemplates>
 </file>
 
 <file path=customXml/item3.xml><?xml version="1.0" encoding="utf-8"?>
@@ -36835,19 +36979,19 @@
 </file>
 
 <file path=customXml/itemProps1.xml><?xml version="1.0" encoding="utf-8"?>
+<ds:datastoreItem xmlns:ds="http://schemas.openxmlformats.org/officeDocument/2006/customXml" ds:itemID="{1A449C04-64B3-4403-94B7-8D2284C38D1B}">
+  <ds:schemaRefs>
+    <ds:schemaRef ds:uri="http://schemas.microsoft.com/sharepoint/v3/contenttype/forms"/>
+  </ds:schemaRefs>
+</ds:datastoreItem>
+</file>
+
+<file path=customXml/itemProps2.xml><?xml version="1.0" encoding="utf-8"?>
 <ds:datastoreItem xmlns:ds="http://schemas.openxmlformats.org/officeDocument/2006/customXml" ds:itemID="{FBDEF148-1770-458F-8F5B-C3D0A278AA97}">
   <ds:schemaRefs>
     <ds:schemaRef ds:uri="http://schemas.microsoft.com/office/2006/metadata/properties"/>
     <ds:schemaRef ds:uri="http://schemas.microsoft.com/office/infopath/2007/PartnerControls"/>
     <ds:schemaRef ds:uri="71af3243-3dd4-4a8d-8c0d-dd76da1f02a5"/>
-  </ds:schemaRefs>
-</ds:datastoreItem>
-</file>
-
-<file path=customXml/itemProps2.xml><?xml version="1.0" encoding="utf-8"?>
-<ds:datastoreItem xmlns:ds="http://schemas.openxmlformats.org/officeDocument/2006/customXml" ds:itemID="{1A449C04-64B3-4403-94B7-8D2284C38D1B}">
-  <ds:schemaRefs>
-    <ds:schemaRef ds:uri="http://schemas.microsoft.com/sharepoint/v3/contenttype/forms"/>
   </ds:schemaRefs>
 </ds:datastoreItem>
 </file>

</xml_diff>